<commit_message>
Documentation files updated, some files edited
</commit_message>
<xml_diff>
--- a/Documentation.pptx
+++ b/Documentation.pptx
@@ -10,25 +10,22 @@
     <p:sldId id="259" r:id="rId4"/>
     <p:sldId id="258" r:id="rId5"/>
     <p:sldId id="260" r:id="rId6"/>
-    <p:sldId id="279" r:id="rId7"/>
-    <p:sldId id="261" r:id="rId8"/>
-    <p:sldId id="262" r:id="rId9"/>
-    <p:sldId id="263" r:id="rId10"/>
-    <p:sldId id="264" r:id="rId11"/>
-    <p:sldId id="265" r:id="rId12"/>
-    <p:sldId id="266" r:id="rId13"/>
-    <p:sldId id="267" r:id="rId14"/>
-    <p:sldId id="268" r:id="rId15"/>
-    <p:sldId id="269" r:id="rId16"/>
-    <p:sldId id="270" r:id="rId17"/>
-    <p:sldId id="271" r:id="rId18"/>
-    <p:sldId id="272" r:id="rId19"/>
-    <p:sldId id="273" r:id="rId20"/>
-    <p:sldId id="274" r:id="rId21"/>
-    <p:sldId id="275" r:id="rId22"/>
-    <p:sldId id="276" r:id="rId23"/>
-    <p:sldId id="277" r:id="rId24"/>
-    <p:sldId id="278" r:id="rId25"/>
+    <p:sldId id="263" r:id="rId7"/>
+    <p:sldId id="264" r:id="rId8"/>
+    <p:sldId id="265" r:id="rId9"/>
+    <p:sldId id="266" r:id="rId10"/>
+    <p:sldId id="267" r:id="rId11"/>
+    <p:sldId id="268" r:id="rId12"/>
+    <p:sldId id="269" r:id="rId13"/>
+    <p:sldId id="270" r:id="rId14"/>
+    <p:sldId id="271" r:id="rId15"/>
+    <p:sldId id="272" r:id="rId16"/>
+    <p:sldId id="273" r:id="rId17"/>
+    <p:sldId id="274" r:id="rId18"/>
+    <p:sldId id="275" r:id="rId19"/>
+    <p:sldId id="276" r:id="rId20"/>
+    <p:sldId id="277" r:id="rId21"/>
+    <p:sldId id="278" r:id="rId22"/>
   </p:sldIdLst>
   <p:sldSz cx="12192000" cy="6858000"/>
   <p:notesSz cx="6858000" cy="9144000"/>
@@ -284,7 +281,7 @@
           <a:p>
             <a:fld id="{D10DE2CF-902A-46AF-9564-2F9C19EC01E6}" type="datetimeFigureOut">
               <a:rPr lang="en-FI" smtClean="0"/>
-              <a:t>08/10/2024</a:t>
+              <a:t>14/10/2024</a:t>
             </a:fld>
             <a:endParaRPr lang="en-FI"/>
           </a:p>
@@ -484,7 +481,7 @@
           <a:p>
             <a:fld id="{D10DE2CF-902A-46AF-9564-2F9C19EC01E6}" type="datetimeFigureOut">
               <a:rPr lang="en-FI" smtClean="0"/>
-              <a:t>08/10/2024</a:t>
+              <a:t>14/10/2024</a:t>
             </a:fld>
             <a:endParaRPr lang="en-FI"/>
           </a:p>
@@ -694,7 +691,7 @@
           <a:p>
             <a:fld id="{D10DE2CF-902A-46AF-9564-2F9C19EC01E6}" type="datetimeFigureOut">
               <a:rPr lang="en-FI" smtClean="0"/>
-              <a:t>08/10/2024</a:t>
+              <a:t>14/10/2024</a:t>
             </a:fld>
             <a:endParaRPr lang="en-FI"/>
           </a:p>
@@ -894,7 +891,7 @@
           <a:p>
             <a:fld id="{D10DE2CF-902A-46AF-9564-2F9C19EC01E6}" type="datetimeFigureOut">
               <a:rPr lang="en-FI" smtClean="0"/>
-              <a:t>08/10/2024</a:t>
+              <a:t>14/10/2024</a:t>
             </a:fld>
             <a:endParaRPr lang="en-FI"/>
           </a:p>
@@ -1170,7 +1167,7 @@
           <a:p>
             <a:fld id="{D10DE2CF-902A-46AF-9564-2F9C19EC01E6}" type="datetimeFigureOut">
               <a:rPr lang="en-FI" smtClean="0"/>
-              <a:t>08/10/2024</a:t>
+              <a:t>14/10/2024</a:t>
             </a:fld>
             <a:endParaRPr lang="en-FI"/>
           </a:p>
@@ -1438,7 +1435,7 @@
           <a:p>
             <a:fld id="{D10DE2CF-902A-46AF-9564-2F9C19EC01E6}" type="datetimeFigureOut">
               <a:rPr lang="en-FI" smtClean="0"/>
-              <a:t>08/10/2024</a:t>
+              <a:t>14/10/2024</a:t>
             </a:fld>
             <a:endParaRPr lang="en-FI"/>
           </a:p>
@@ -1853,7 +1850,7 @@
           <a:p>
             <a:fld id="{D10DE2CF-902A-46AF-9564-2F9C19EC01E6}" type="datetimeFigureOut">
               <a:rPr lang="en-FI" smtClean="0"/>
-              <a:t>08/10/2024</a:t>
+              <a:t>14/10/2024</a:t>
             </a:fld>
             <a:endParaRPr lang="en-FI"/>
           </a:p>
@@ -1995,7 +1992,7 @@
           <a:p>
             <a:fld id="{D10DE2CF-902A-46AF-9564-2F9C19EC01E6}" type="datetimeFigureOut">
               <a:rPr lang="en-FI" smtClean="0"/>
-              <a:t>08/10/2024</a:t>
+              <a:t>14/10/2024</a:t>
             </a:fld>
             <a:endParaRPr lang="en-FI"/>
           </a:p>
@@ -2108,7 +2105,7 @@
           <a:p>
             <a:fld id="{D10DE2CF-902A-46AF-9564-2F9C19EC01E6}" type="datetimeFigureOut">
               <a:rPr lang="en-FI" smtClean="0"/>
-              <a:t>08/10/2024</a:t>
+              <a:t>14/10/2024</a:t>
             </a:fld>
             <a:endParaRPr lang="en-FI"/>
           </a:p>
@@ -2421,7 +2418,7 @@
           <a:p>
             <a:fld id="{D10DE2CF-902A-46AF-9564-2F9C19EC01E6}" type="datetimeFigureOut">
               <a:rPr lang="en-FI" smtClean="0"/>
-              <a:t>08/10/2024</a:t>
+              <a:t>14/10/2024</a:t>
             </a:fld>
             <a:endParaRPr lang="en-FI"/>
           </a:p>
@@ -2710,7 +2707,7 @@
           <a:p>
             <a:fld id="{D10DE2CF-902A-46AF-9564-2F9C19EC01E6}" type="datetimeFigureOut">
               <a:rPr lang="en-FI" smtClean="0"/>
-              <a:t>08/10/2024</a:t>
+              <a:t>14/10/2024</a:t>
             </a:fld>
             <a:endParaRPr lang="en-FI"/>
           </a:p>
@@ -2953,7 +2950,7 @@
           <a:p>
             <a:fld id="{D10DE2CF-902A-46AF-9564-2F9C19EC01E6}" type="datetimeFigureOut">
               <a:rPr lang="en-FI" smtClean="0"/>
-              <a:t>08/10/2024</a:t>
+              <a:t>14/10/2024</a:t>
             </a:fld>
             <a:endParaRPr lang="en-FI"/>
           </a:p>
@@ -3453,7 +3450,7 @@
     </p:spTree>
     <p:extLst>
       <p:ext uri="{BB962C8B-B14F-4D97-AF65-F5344CB8AC3E}">
-        <p14:creationId xmlns:p14="http://schemas.microsoft.com/office/powerpoint/2010/main" val="1653702822"/>
+        <p14:creationId xmlns:p14="http://schemas.microsoft.com/office/powerpoint/2010/main" val="4291727945"/>
       </p:ext>
     </p:extLst>
   </p:cSld>
@@ -3483,7 +3480,7 @@
     </p:spTree>
     <p:extLst>
       <p:ext uri="{BB962C8B-B14F-4D97-AF65-F5344CB8AC3E}">
-        <p14:creationId xmlns:p14="http://schemas.microsoft.com/office/powerpoint/2010/main" val="2604361364"/>
+        <p14:creationId xmlns:p14="http://schemas.microsoft.com/office/powerpoint/2010/main" val="112895031"/>
       </p:ext>
     </p:extLst>
   </p:cSld>
@@ -3513,7 +3510,7 @@
     </p:spTree>
     <p:extLst>
       <p:ext uri="{BB962C8B-B14F-4D97-AF65-F5344CB8AC3E}">
-        <p14:creationId xmlns:p14="http://schemas.microsoft.com/office/powerpoint/2010/main" val="1186250606"/>
+        <p14:creationId xmlns:p14="http://schemas.microsoft.com/office/powerpoint/2010/main" val="2670231140"/>
       </p:ext>
     </p:extLst>
   </p:cSld>
@@ -3543,7 +3540,7 @@
     </p:spTree>
     <p:extLst>
       <p:ext uri="{BB962C8B-B14F-4D97-AF65-F5344CB8AC3E}">
-        <p14:creationId xmlns:p14="http://schemas.microsoft.com/office/powerpoint/2010/main" val="4291727945"/>
+        <p14:creationId xmlns:p14="http://schemas.microsoft.com/office/powerpoint/2010/main" val="2814746260"/>
       </p:ext>
     </p:extLst>
   </p:cSld>
@@ -3573,7 +3570,7 @@
     </p:spTree>
     <p:extLst>
       <p:ext uri="{BB962C8B-B14F-4D97-AF65-F5344CB8AC3E}">
-        <p14:creationId xmlns:p14="http://schemas.microsoft.com/office/powerpoint/2010/main" val="112895031"/>
+        <p14:creationId xmlns:p14="http://schemas.microsoft.com/office/powerpoint/2010/main" val="4237227799"/>
       </p:ext>
     </p:extLst>
   </p:cSld>
@@ -3603,7 +3600,7 @@
     </p:spTree>
     <p:extLst>
       <p:ext uri="{BB962C8B-B14F-4D97-AF65-F5344CB8AC3E}">
-        <p14:creationId xmlns:p14="http://schemas.microsoft.com/office/powerpoint/2010/main" val="2670231140"/>
+        <p14:creationId xmlns:p14="http://schemas.microsoft.com/office/powerpoint/2010/main" val="2068335131"/>
       </p:ext>
     </p:extLst>
   </p:cSld>
@@ -3633,7 +3630,7 @@
     </p:spTree>
     <p:extLst>
       <p:ext uri="{BB962C8B-B14F-4D97-AF65-F5344CB8AC3E}">
-        <p14:creationId xmlns:p14="http://schemas.microsoft.com/office/powerpoint/2010/main" val="2814746260"/>
+        <p14:creationId xmlns:p14="http://schemas.microsoft.com/office/powerpoint/2010/main" val="3198617961"/>
       </p:ext>
     </p:extLst>
   </p:cSld>
@@ -3663,7 +3660,7 @@
     </p:spTree>
     <p:extLst>
       <p:ext uri="{BB962C8B-B14F-4D97-AF65-F5344CB8AC3E}">
-        <p14:creationId xmlns:p14="http://schemas.microsoft.com/office/powerpoint/2010/main" val="4237227799"/>
+        <p14:creationId xmlns:p14="http://schemas.microsoft.com/office/powerpoint/2010/main" val="2062658634"/>
       </p:ext>
     </p:extLst>
   </p:cSld>
@@ -3693,7 +3690,7 @@
     </p:spTree>
     <p:extLst>
       <p:ext uri="{BB962C8B-B14F-4D97-AF65-F5344CB8AC3E}">
-        <p14:creationId xmlns:p14="http://schemas.microsoft.com/office/powerpoint/2010/main" val="2068335131"/>
+        <p14:creationId xmlns:p14="http://schemas.microsoft.com/office/powerpoint/2010/main" val="46485246"/>
       </p:ext>
     </p:extLst>
   </p:cSld>
@@ -3723,7 +3720,7 @@
     </p:spTree>
     <p:extLst>
       <p:ext uri="{BB962C8B-B14F-4D97-AF65-F5344CB8AC3E}">
-        <p14:creationId xmlns:p14="http://schemas.microsoft.com/office/powerpoint/2010/main" val="3198617961"/>
+        <p14:creationId xmlns:p14="http://schemas.microsoft.com/office/powerpoint/2010/main" val="726762394"/>
       </p:ext>
     </p:extLst>
   </p:cSld>
@@ -3821,7 +3818,7 @@
     </p:spTree>
     <p:extLst>
       <p:ext uri="{BB962C8B-B14F-4D97-AF65-F5344CB8AC3E}">
-        <p14:creationId xmlns:p14="http://schemas.microsoft.com/office/powerpoint/2010/main" val="2062658634"/>
+        <p14:creationId xmlns:p14="http://schemas.microsoft.com/office/powerpoint/2010/main" val="3416969938"/>
       </p:ext>
     </p:extLst>
   </p:cSld>
@@ -3832,96 +3829,6 @@
 </file>
 
 <file path=ppt/slides/slide21.xml><?xml version="1.0" encoding="utf-8"?>
-<p:sld xmlns:a="http://schemas.openxmlformats.org/drawingml/2006/main" xmlns:r="http://schemas.openxmlformats.org/officeDocument/2006/relationships" xmlns:p="http://schemas.openxmlformats.org/presentationml/2006/main">
-  <p:cSld>
-    <p:spTree>
-      <p:nvGrpSpPr>
-        <p:cNvPr id="1" name=""/>
-        <p:cNvGrpSpPr/>
-        <p:nvPr/>
-      </p:nvGrpSpPr>
-      <p:grpSpPr>
-        <a:xfrm>
-          <a:off x="0" y="0"/>
-          <a:ext cx="0" cy="0"/>
-          <a:chOff x="0" y="0"/>
-          <a:chExt cx="0" cy="0"/>
-        </a:xfrm>
-      </p:grpSpPr>
-    </p:spTree>
-    <p:extLst>
-      <p:ext uri="{BB962C8B-B14F-4D97-AF65-F5344CB8AC3E}">
-        <p14:creationId xmlns:p14="http://schemas.microsoft.com/office/powerpoint/2010/main" val="46485246"/>
-      </p:ext>
-    </p:extLst>
-  </p:cSld>
-  <p:clrMapOvr>
-    <a:masterClrMapping/>
-  </p:clrMapOvr>
-</p:sld>
-</file>
-
-<file path=ppt/slides/slide22.xml><?xml version="1.0" encoding="utf-8"?>
-<p:sld xmlns:a="http://schemas.openxmlformats.org/drawingml/2006/main" xmlns:r="http://schemas.openxmlformats.org/officeDocument/2006/relationships" xmlns:p="http://schemas.openxmlformats.org/presentationml/2006/main">
-  <p:cSld>
-    <p:spTree>
-      <p:nvGrpSpPr>
-        <p:cNvPr id="1" name=""/>
-        <p:cNvGrpSpPr/>
-        <p:nvPr/>
-      </p:nvGrpSpPr>
-      <p:grpSpPr>
-        <a:xfrm>
-          <a:off x="0" y="0"/>
-          <a:ext cx="0" cy="0"/>
-          <a:chOff x="0" y="0"/>
-          <a:chExt cx="0" cy="0"/>
-        </a:xfrm>
-      </p:grpSpPr>
-    </p:spTree>
-    <p:extLst>
-      <p:ext uri="{BB962C8B-B14F-4D97-AF65-F5344CB8AC3E}">
-        <p14:creationId xmlns:p14="http://schemas.microsoft.com/office/powerpoint/2010/main" val="726762394"/>
-      </p:ext>
-    </p:extLst>
-  </p:cSld>
-  <p:clrMapOvr>
-    <a:masterClrMapping/>
-  </p:clrMapOvr>
-</p:sld>
-</file>
-
-<file path=ppt/slides/slide23.xml><?xml version="1.0" encoding="utf-8"?>
-<p:sld xmlns:a="http://schemas.openxmlformats.org/drawingml/2006/main" xmlns:r="http://schemas.openxmlformats.org/officeDocument/2006/relationships" xmlns:p="http://schemas.openxmlformats.org/presentationml/2006/main">
-  <p:cSld>
-    <p:spTree>
-      <p:nvGrpSpPr>
-        <p:cNvPr id="1" name=""/>
-        <p:cNvGrpSpPr/>
-        <p:nvPr/>
-      </p:nvGrpSpPr>
-      <p:grpSpPr>
-        <a:xfrm>
-          <a:off x="0" y="0"/>
-          <a:ext cx="0" cy="0"/>
-          <a:chOff x="0" y="0"/>
-          <a:chExt cx="0" cy="0"/>
-        </a:xfrm>
-      </p:grpSpPr>
-    </p:spTree>
-    <p:extLst>
-      <p:ext uri="{BB962C8B-B14F-4D97-AF65-F5344CB8AC3E}">
-        <p14:creationId xmlns:p14="http://schemas.microsoft.com/office/powerpoint/2010/main" val="3416969938"/>
-      </p:ext>
-    </p:extLst>
-  </p:cSld>
-  <p:clrMapOvr>
-    <a:masterClrMapping/>
-  </p:clrMapOvr>
-</p:sld>
-</file>
-
-<file path=ppt/slides/slide24.xml><?xml version="1.0" encoding="utf-8"?>
 <p:sld xmlns:a="http://schemas.openxmlformats.org/drawingml/2006/main" xmlns:r="http://schemas.openxmlformats.org/officeDocument/2006/relationships" xmlns:p="http://schemas.openxmlformats.org/presentationml/2006/main">
   <p:cSld>
     <p:spTree>
@@ -4148,60 +4055,10 @@
           <a:chExt cx="0" cy="0"/>
         </a:xfrm>
       </p:grpSpPr>
-      <p:sp>
-        <p:nvSpPr>
-          <p:cNvPr id="2" name="Title 1">
-            <a:extLst>
-              <a:ext uri="{FF2B5EF4-FFF2-40B4-BE49-F238E27FC236}">
-                <a16:creationId xmlns:a16="http://schemas.microsoft.com/office/drawing/2014/main" id="{C95480FA-5E82-246F-143B-C75E30735356}"/>
-              </a:ext>
-            </a:extLst>
-          </p:cNvPr>
-          <p:cNvSpPr>
-            <a:spLocks noGrp="1"/>
-          </p:cNvSpPr>
-          <p:nvPr>
-            <p:ph type="ctrTitle"/>
-          </p:nvPr>
-        </p:nvSpPr>
-        <p:spPr>
-          <a:xfrm>
-            <a:off x="1524000" y="1122362"/>
-            <a:ext cx="9144000" cy="3901921"/>
-          </a:xfrm>
-        </p:spPr>
-        <p:txBody>
-          <a:bodyPr>
-            <a:normAutofit/>
-          </a:bodyPr>
-          <a:lstStyle/>
-          <a:p>
-            <a:r>
-              <a:rPr lang="fi-FI" dirty="0"/>
-              <a:t>Full-text search with </a:t>
-            </a:r>
-            <a:br>
-              <a:rPr lang="fi-FI" dirty="0"/>
-            </a:br>
-            <a:r>
-              <a:rPr lang="fi-FI" dirty="0"/>
-              <a:t>the test data</a:t>
-            </a:r>
-            <a:br>
-              <a:rPr lang="fi-FI" dirty="0"/>
-            </a:br>
-            <a:r>
-              <a:rPr lang="fi-FI" dirty="0"/>
-              <a:t>all columns </a:t>
-            </a:r>
-            <a:endParaRPr lang="en-FI" dirty="0"/>
-          </a:p>
-        </p:txBody>
-      </p:sp>
     </p:spTree>
     <p:extLst>
       <p:ext uri="{BB962C8B-B14F-4D97-AF65-F5344CB8AC3E}">
-        <p14:creationId xmlns:p14="http://schemas.microsoft.com/office/powerpoint/2010/main" val="4217100914"/>
+        <p14:creationId xmlns:p14="http://schemas.microsoft.com/office/powerpoint/2010/main" val="974375253"/>
       </p:ext>
     </p:extLst>
   </p:cSld>
@@ -4228,40 +4085,10 @@
           <a:chExt cx="0" cy="0"/>
         </a:xfrm>
       </p:grpSpPr>
-      <p:pic>
-        <p:nvPicPr>
-          <p:cNvPr id="5" name="Picture 4">
-            <a:extLst>
-              <a:ext uri="{FF2B5EF4-FFF2-40B4-BE49-F238E27FC236}">
-                <a16:creationId xmlns:a16="http://schemas.microsoft.com/office/drawing/2014/main" id="{2A601EA0-8F37-A4DF-7108-5BC7C5FEB873}"/>
-              </a:ext>
-            </a:extLst>
-          </p:cNvPr>
-          <p:cNvPicPr>
-            <a:picLocks noChangeAspect="1"/>
-          </p:cNvPicPr>
-          <p:nvPr/>
-        </p:nvPicPr>
-        <p:blipFill>
-          <a:blip r:embed="rId2"/>
-          <a:stretch>
-            <a:fillRect/>
-          </a:stretch>
-        </p:blipFill>
-        <p:spPr>
-          <a:xfrm>
-            <a:off x="1011942" y="912508"/>
-            <a:ext cx="10168116" cy="4660869"/>
-          </a:xfrm>
-          <a:prstGeom prst="rect">
-            <a:avLst/>
-          </a:prstGeom>
-        </p:spPr>
-      </p:pic>
     </p:spTree>
     <p:extLst>
       <p:ext uri="{BB962C8B-B14F-4D97-AF65-F5344CB8AC3E}">
-        <p14:creationId xmlns:p14="http://schemas.microsoft.com/office/powerpoint/2010/main" val="185945798"/>
+        <p14:creationId xmlns:p14="http://schemas.microsoft.com/office/powerpoint/2010/main" val="1653702822"/>
       </p:ext>
     </p:extLst>
   </p:cSld>
@@ -4288,40 +4115,10 @@
           <a:chExt cx="0" cy="0"/>
         </a:xfrm>
       </p:grpSpPr>
-      <p:pic>
-        <p:nvPicPr>
-          <p:cNvPr id="3" name="Picture 2">
-            <a:extLst>
-              <a:ext uri="{FF2B5EF4-FFF2-40B4-BE49-F238E27FC236}">
-                <a16:creationId xmlns:a16="http://schemas.microsoft.com/office/drawing/2014/main" id="{2129C7A2-E300-E444-6755-C34A78C9D5A6}"/>
-              </a:ext>
-            </a:extLst>
-          </p:cNvPr>
-          <p:cNvPicPr>
-            <a:picLocks noChangeAspect="1"/>
-          </p:cNvPicPr>
-          <p:nvPr/>
-        </p:nvPicPr>
-        <p:blipFill>
-          <a:blip r:embed="rId2"/>
-          <a:stretch>
-            <a:fillRect/>
-          </a:stretch>
-        </p:blipFill>
-        <p:spPr>
-          <a:xfrm>
-            <a:off x="1946559" y="627889"/>
-            <a:ext cx="7490877" cy="4461600"/>
-          </a:xfrm>
-          <a:prstGeom prst="rect">
-            <a:avLst/>
-          </a:prstGeom>
-        </p:spPr>
-      </p:pic>
     </p:spTree>
     <p:extLst>
       <p:ext uri="{BB962C8B-B14F-4D97-AF65-F5344CB8AC3E}">
-        <p14:creationId xmlns:p14="http://schemas.microsoft.com/office/powerpoint/2010/main" val="3201819673"/>
+        <p14:creationId xmlns:p14="http://schemas.microsoft.com/office/powerpoint/2010/main" val="2604361364"/>
       </p:ext>
     </p:extLst>
   </p:cSld>
@@ -4351,7 +4148,7 @@
     </p:spTree>
     <p:extLst>
       <p:ext uri="{BB962C8B-B14F-4D97-AF65-F5344CB8AC3E}">
-        <p14:creationId xmlns:p14="http://schemas.microsoft.com/office/powerpoint/2010/main" val="974375253"/>
+        <p14:creationId xmlns:p14="http://schemas.microsoft.com/office/powerpoint/2010/main" val="1186250606"/>
       </p:ext>
     </p:extLst>
   </p:cSld>

</xml_diff>